<commit_message>
se agrega el ej2 y el ppt
</commit_message>
<xml_diff>
--- a/M2/jQuery/jQuery.pptx
+++ b/M2/jQuery/jQuery.pptx
@@ -12579,7 +12579,7 @@
               <a:defRPr/>
             </a:pPr>
             <a:r>
-              <a:rPr lang="en-US" sz="2400" kern="0" dirty="0" err="1">
+              <a:rPr lang="en-US" sz="2400" kern="0" dirty="0">
                 <a:solidFill>
                   <a:srgbClr val="000000"/>
                 </a:solidFill>
@@ -12588,17 +12588,8 @@
                 <a:cs typeface="Arial"/>
                 <a:sym typeface="Arial"/>
               </a:rPr>
-              <a:t>Jquery</a:t>
-            </a:r>
-            <a:endParaRPr lang="en-US" sz="2400" kern="0" dirty="0">
-              <a:solidFill>
-                <a:srgbClr val="000000"/>
-              </a:solidFill>
-              <a:latin typeface="Arial"/>
-              <a:ea typeface="Arial"/>
-              <a:cs typeface="Arial"/>
-              <a:sym typeface="Arial"/>
-            </a:endParaRPr>
+              <a:t>jQuery</a:t>
+            </a:r>
           </a:p>
           <a:p>
             <a:pPr marL="457200" marR="0" lvl="1" indent="-152400" algn="l" defTabSz="914400" rtl="0" eaLnBrk="1" fontAlgn="auto" latinLnBrk="0" hangingPunct="1">
@@ -23282,7 +23273,23 @@
           <a:p>
             <a:r>
               <a:rPr lang="es-MX" dirty="0"/>
-              <a:t>JQuery tiene una sintaxis un poco diferente a JavaScript puro, esta consta de un signo de dólar, que indica que se está trabajando con JQuery y, entre paréntesis, encontraremos indicado el selector al cual nos dirigimos. Esto puede ir seguido de una acción a realizar con este selector.</a:t>
+              <a:t>JQuery tiene una sintaxis un poco diferente a JavaScript puro, esta consta de un </a:t>
+            </a:r>
+            <a:r>
+              <a:rPr lang="es-MX" b="1" dirty="0"/>
+              <a:t>signo de dólar</a:t>
+            </a:r>
+            <a:r>
+              <a:rPr lang="es-MX" dirty="0"/>
+              <a:t>, que indica que se está trabajando con JQuery y, </a:t>
+            </a:r>
+            <a:r>
+              <a:rPr lang="es-MX" b="1" dirty="0"/>
+              <a:t>entre paréntesis, encontraremos indicado el selector al cual nos dirigimos</a:t>
+            </a:r>
+            <a:r>
+              <a:rPr lang="es-MX" dirty="0"/>
+              <a:t>. Esto puede ir seguido de una acción a realizar con este selector.</a:t>
             </a:r>
             <a:endParaRPr lang="es-MX" b="1" dirty="0"/>
           </a:p>

</xml_diff>